<commit_message>
found and fixed another typo
</commit_message>
<xml_diff>
--- a/6 - Generalization Bounds/Slides.pptx
+++ b/6 - Generalization Bounds/Slides.pptx
@@ -162,7 +162,7 @@
 <file path=ppt/revisionInfo.xml><?xml version="1.0" encoding="utf-8"?>
 <p1510:revInfo xmlns:a="http://schemas.openxmlformats.org/drawingml/2006/main" xmlns:r="http://schemas.openxmlformats.org/officeDocument/2006/relationships" xmlns:p1510="http://schemas.microsoft.com/office/powerpoint/2015/10/main">
   <p1510:revLst>
-    <p1510:client id="{AF642132-5A98-4464-8D09-85A8C5D9CC76}" v="660" dt="2026-02-04T13:13:16.647"/>
+    <p1510:client id="{AF642132-5A98-4464-8D09-85A8C5D9CC76}" v="771" dt="2026-02-05T12:42:46.005"/>
   </p1510:revLst>
 </p1510:revInfo>
 </file>
@@ -172,7 +172,7 @@
   <pc:docChgLst>
     <pc:chgData name="Dominik Dold" userId="f2e3d405450aa2f4" providerId="LiveId" clId="{5805CB45-291F-49AE-A1B6-715AA1DB6F91}"/>
     <pc:docChg chg="undo redo custSel addSld delSld modSld sldOrd modMainMaster">
-      <pc:chgData name="Dominik Dold" userId="f2e3d405450aa2f4" providerId="LiveId" clId="{5805CB45-291F-49AE-A1B6-715AA1DB6F91}" dt="2026-02-04T13:13:16.647" v="50045" actId="20577"/>
+      <pc:chgData name="Dominik Dold" userId="f2e3d405450aa2f4" providerId="LiveId" clId="{5805CB45-291F-49AE-A1B6-715AA1DB6F91}" dt="2026-02-05T12:42:46.005" v="50156" actId="20577"/>
       <pc:docMkLst>
         <pc:docMk/>
       </pc:docMkLst>
@@ -563,7 +563,7 @@
         </pc:picChg>
       </pc:sldChg>
       <pc:sldChg chg="addSp delSp modSp new mod delAnim modAnim">
-        <pc:chgData name="Dominik Dold" userId="f2e3d405450aa2f4" providerId="LiveId" clId="{5805CB45-291F-49AE-A1B6-715AA1DB6F91}" dt="2026-01-14T15:39:52.315" v="49076"/>
+        <pc:chgData name="Dominik Dold" userId="f2e3d405450aa2f4" providerId="LiveId" clId="{5805CB45-291F-49AE-A1B6-715AA1DB6F91}" dt="2026-02-05T12:42:46.005" v="50156" actId="20577"/>
         <pc:sldMkLst>
           <pc:docMk/>
           <pc:sldMk cId="3004122205" sldId="347"/>
@@ -601,7 +601,7 @@
           </ac:spMkLst>
         </pc:spChg>
         <pc:spChg chg="add mod">
-          <ac:chgData name="Dominik Dold" userId="f2e3d405450aa2f4" providerId="LiveId" clId="{5805CB45-291F-49AE-A1B6-715AA1DB6F91}" dt="2026-01-13T13:20:10.372" v="42947" actId="20577"/>
+          <ac:chgData name="Dominik Dold" userId="f2e3d405450aa2f4" providerId="LiveId" clId="{5805CB45-291F-49AE-A1B6-715AA1DB6F91}" dt="2026-02-05T12:42:46.005" v="50156" actId="20577"/>
           <ac:spMkLst>
             <pc:docMk/>
             <pc:sldMk cId="3004122205" sldId="347"/>
@@ -657,7 +657,7 @@
           </ac:spMkLst>
         </pc:spChg>
         <pc:spChg chg="add mod">
-          <ac:chgData name="Dominik Dold" userId="f2e3d405450aa2f4" providerId="LiveId" clId="{5805CB45-291F-49AE-A1B6-715AA1DB6F91}" dt="2026-01-13T13:26:01.073" v="43108" actId="20577"/>
+          <ac:chgData name="Dominik Dold" userId="f2e3d405450aa2f4" providerId="LiveId" clId="{5805CB45-291F-49AE-A1B6-715AA1DB6F91}" dt="2026-02-05T12:42:08.618" v="50124" actId="20577"/>
           <ac:spMkLst>
             <pc:docMk/>
             <pc:sldMk cId="3004122205" sldId="347"/>
@@ -894,7 +894,7 @@
         </pc:picChg>
       </pc:sldChg>
       <pc:sldChg chg="addSp delSp modSp add mod ord">
-        <pc:chgData name="Dominik Dold" userId="f2e3d405450aa2f4" providerId="LiveId" clId="{5805CB45-291F-49AE-A1B6-715AA1DB6F91}" dt="2026-02-04T13:12:09.139" v="50044" actId="20577"/>
+        <pc:chgData name="Dominik Dold" userId="f2e3d405450aa2f4" providerId="LiveId" clId="{5805CB45-291F-49AE-A1B6-715AA1DB6F91}" dt="2026-02-05T12:41:21.572" v="50064" actId="20577"/>
         <pc:sldMkLst>
           <pc:docMk/>
           <pc:sldMk cId="2712640076" sldId="354"/>
@@ -908,7 +908,7 @@
           </ac:spMkLst>
         </pc:spChg>
         <pc:spChg chg="add mod">
-          <ac:chgData name="Dominik Dold" userId="f2e3d405450aa2f4" providerId="LiveId" clId="{5805CB45-291F-49AE-A1B6-715AA1DB6F91}" dt="2026-01-12T15:59:15.389" v="42896" actId="1076"/>
+          <ac:chgData name="Dominik Dold" userId="f2e3d405450aa2f4" providerId="LiveId" clId="{5805CB45-291F-49AE-A1B6-715AA1DB6F91}" dt="2026-02-05T12:41:21.572" v="50064" actId="20577"/>
           <ac:spMkLst>
             <pc:docMk/>
             <pc:sldMk cId="2712640076" sldId="354"/>
@@ -1730,7 +1730,7 @@
           <a:p>
             <a:fld id="{5ECCE08E-FD48-4ABE-9805-2EBFDE106AB3}" type="datetimeFigureOut">
               <a:rPr lang="en-GB" smtClean="0"/>
-              <a:t>04/02/2026</a:t>
+              <a:t>05/02/2026</a:t>
             </a:fld>
             <a:endParaRPr lang="en-GB"/>
           </a:p>
@@ -2641,7 +2641,7 @@
           <a:p>
             <a:fld id="{CBE30051-C6DB-4954-8A39-7BBB06410C9B}" type="datetime1">
               <a:rPr lang="en-GB" smtClean="0"/>
-              <a:t>04/02/2026</a:t>
+              <a:t>05/02/2026</a:t>
             </a:fld>
             <a:endParaRPr lang="en-GB"/>
           </a:p>
@@ -2830,7 +2830,7 @@
           <a:p>
             <a:fld id="{3D7C210B-129B-4959-BC37-B5393D6AEA88}" type="datetime1">
               <a:rPr lang="en-GB" smtClean="0"/>
-              <a:t>04/02/2026</a:t>
+              <a:t>05/02/2026</a:t>
             </a:fld>
             <a:endParaRPr lang="en-GB"/>
           </a:p>
@@ -3029,7 +3029,7 @@
           <a:p>
             <a:fld id="{742CE41D-2DBF-4108-A0A6-B66ADCBB53B9}" type="datetime1">
               <a:rPr lang="en-GB" smtClean="0"/>
-              <a:t>04/02/2026</a:t>
+              <a:t>05/02/2026</a:t>
             </a:fld>
             <a:endParaRPr lang="en-GB"/>
           </a:p>
@@ -3568,7 +3568,7 @@
           <a:p>
             <a:fld id="{14CB3D7D-A06C-4DE9-992B-5B65F53834D9}" type="datetime1">
               <a:rPr lang="en-GB" smtClean="0"/>
-              <a:t>04/02/2026</a:t>
+              <a:t>05/02/2026</a:t>
             </a:fld>
             <a:endParaRPr lang="en-GB"/>
           </a:p>
@@ -3934,7 +3934,7 @@
           <a:p>
             <a:fld id="{C67A38C1-9379-4361-9946-D3680B7F47FE}" type="datetime1">
               <a:rPr lang="en-GB" smtClean="0"/>
-              <a:t>04/02/2026</a:t>
+              <a:t>05/02/2026</a:t>
             </a:fld>
             <a:endParaRPr lang="en-GB"/>
           </a:p>
@@ -4071,7 +4071,7 @@
           <a:p>
             <a:fld id="{B9C7243E-F364-48F3-BBAD-37A743E237B4}" type="datetime1">
               <a:rPr lang="en-GB" smtClean="0"/>
-              <a:t>04/02/2026</a:t>
+              <a:t>05/02/2026</a:t>
             </a:fld>
             <a:endParaRPr lang="en-GB"/>
           </a:p>
@@ -4477,7 +4477,7 @@
           <a:p>
             <a:fld id="{5FC0CC01-3EBF-4DED-A29A-5DE22DB44D36}" type="datetime1">
               <a:rPr lang="en-GB" smtClean="0"/>
-              <a:t>04/02/2026</a:t>
+              <a:t>05/02/2026</a:t>
             </a:fld>
             <a:endParaRPr lang="en-GB"/>
           </a:p>
@@ -4713,7 +4713,7 @@
           <a:p>
             <a:fld id="{9CDC136D-BBC1-4797-AC59-38B61BEC7FD1}" type="datetime1">
               <a:rPr lang="en-GB" smtClean="0"/>
-              <a:t>04/02/2026</a:t>
+              <a:t>05/02/2026</a:t>
             </a:fld>
             <a:endParaRPr lang="en-GB"/>
           </a:p>
@@ -5624,8 +5624,8 @@
           </p:sp>
         </mc:Fallback>
       </mc:AlternateContent>
-      <mc:AlternateContent xmlns:mc="http://schemas.openxmlformats.org/markup-compatibility/2006">
-        <mc:Choice xmlns:a14="http://schemas.microsoft.com/office/drawing/2010/main" Requires="a14">
+      <mc:AlternateContent xmlns:mc="http://schemas.openxmlformats.org/markup-compatibility/2006" xmlns:a14="http://schemas.microsoft.com/office/drawing/2010/main">
+        <mc:Choice Requires="a14">
           <p:sp>
             <p:nvSpPr>
               <p:cNvPr id="6" name="TextBox 5">
@@ -5712,7 +5712,7 @@
             </p:txBody>
           </p:sp>
         </mc:Choice>
-        <mc:Fallback>
+        <mc:Fallback xmlns="">
           <p:sp>
             <p:nvSpPr>
               <p:cNvPr id="6" name="TextBox 5">
@@ -6493,8 +6493,8 @@
           </p:sp>
         </mc:Fallback>
       </mc:AlternateContent>
-      <mc:AlternateContent xmlns:mc="http://schemas.openxmlformats.org/markup-compatibility/2006">
-        <mc:Choice xmlns:a14="http://schemas.microsoft.com/office/drawing/2010/main" Requires="a14">
+      <mc:AlternateContent xmlns:mc="http://schemas.openxmlformats.org/markup-compatibility/2006" xmlns:a14="http://schemas.microsoft.com/office/drawing/2010/main">
+        <mc:Choice Requires="a14">
           <p:sp>
             <p:nvSpPr>
               <p:cNvPr id="6" name="TextBox 5">
@@ -6581,7 +6581,7 @@
             </p:txBody>
           </p:sp>
         </mc:Choice>
-        <mc:Fallback>
+        <mc:Fallback xmlns="">
           <p:sp>
             <p:nvSpPr>
               <p:cNvPr id="6" name="TextBox 5">
@@ -7362,8 +7362,8 @@
           </p:sp>
         </mc:Fallback>
       </mc:AlternateContent>
-      <mc:AlternateContent xmlns:mc="http://schemas.openxmlformats.org/markup-compatibility/2006">
-        <mc:Choice xmlns:a14="http://schemas.microsoft.com/office/drawing/2010/main" Requires="a14">
+      <mc:AlternateContent xmlns:mc="http://schemas.openxmlformats.org/markup-compatibility/2006" xmlns:a14="http://schemas.microsoft.com/office/drawing/2010/main">
+        <mc:Choice Requires="a14">
           <p:sp>
             <p:nvSpPr>
               <p:cNvPr id="6" name="TextBox 5">
@@ -7450,7 +7450,7 @@
             </p:txBody>
           </p:sp>
         </mc:Choice>
-        <mc:Fallback>
+        <mc:Fallback xmlns="">
           <p:sp>
             <p:nvSpPr>
               <p:cNvPr id="6" name="TextBox 5">
@@ -7859,8 +7859,8 @@
           </a:fontRef>
         </p:style>
       </p:cxnSp>
-      <mc:AlternateContent xmlns:mc="http://schemas.openxmlformats.org/markup-compatibility/2006" xmlns:a14="http://schemas.microsoft.com/office/drawing/2010/main">
-        <mc:Choice Requires="a14">
+      <mc:AlternateContent xmlns:mc="http://schemas.openxmlformats.org/markup-compatibility/2006">
+        <mc:Choice xmlns:a14="http://schemas.microsoft.com/office/drawing/2010/main" Requires="a14">
           <p:sp>
             <p:nvSpPr>
               <p:cNvPr id="13" name="TextBox 12">
@@ -7903,7 +7903,7 @@
                         <a:latin typeface="Cambria Math" panose="02040503050406030204" pitchFamily="18" charset="0"/>
                         <a:cs typeface="Beaufort for LOL" panose="02020503050000020004" pitchFamily="18" charset="0"/>
                       </a:rPr>
-                      <m:t>𝜖</m:t>
+                      <m:t>𝜅</m:t>
                     </m:r>
                   </m:oMath>
                 </a14:m>
@@ -7915,7 +7915,7 @@
             </p:txBody>
           </p:sp>
         </mc:Choice>
-        <mc:Fallback xmlns="">
+        <mc:Fallback>
           <p:sp>
             <p:nvSpPr>
               <p:cNvPr id="13" name="TextBox 12">
@@ -10235,8 +10235,8 @@
           </a:p>
         </p:txBody>
       </p:sp>
-      <mc:AlternateContent xmlns:mc="http://schemas.openxmlformats.org/markup-compatibility/2006">
-        <mc:Choice xmlns:a14="http://schemas.microsoft.com/office/drawing/2010/main" Requires="a14">
+      <mc:AlternateContent xmlns:mc="http://schemas.openxmlformats.org/markup-compatibility/2006" xmlns:a14="http://schemas.microsoft.com/office/drawing/2010/main">
+        <mc:Choice Requires="a14">
           <p:sp>
             <p:nvSpPr>
               <p:cNvPr id="4" name="TextBox 3">
@@ -10350,7 +10350,7 @@
             </p:txBody>
           </p:sp>
         </mc:Choice>
-        <mc:Fallback>
+        <mc:Fallback xmlns="">
           <p:sp>
             <p:nvSpPr>
               <p:cNvPr id="4" name="TextBox 3">
@@ -10395,8 +10395,8 @@
           </p:sp>
         </mc:Fallback>
       </mc:AlternateContent>
-      <mc:AlternateContent xmlns:mc="http://schemas.openxmlformats.org/markup-compatibility/2006">
-        <mc:Choice xmlns:a14="http://schemas.microsoft.com/office/drawing/2010/main" Requires="a14">
+      <mc:AlternateContent xmlns:mc="http://schemas.openxmlformats.org/markup-compatibility/2006" xmlns:a14="http://schemas.microsoft.com/office/drawing/2010/main">
+        <mc:Choice Requires="a14">
           <p:sp>
             <p:nvSpPr>
               <p:cNvPr id="6" name="TextBox 5">
@@ -10752,7 +10752,7 @@
             </p:txBody>
           </p:sp>
         </mc:Choice>
-        <mc:Fallback>
+        <mc:Fallback xmlns="">
           <p:sp>
             <p:nvSpPr>
               <p:cNvPr id="6" name="TextBox 5">
@@ -12086,8 +12086,8 @@
           </a:p>
         </p:txBody>
       </p:sp>
-      <mc:AlternateContent xmlns:mc="http://schemas.openxmlformats.org/markup-compatibility/2006">
-        <mc:Choice xmlns:a14="http://schemas.microsoft.com/office/drawing/2010/main" Requires="a14">
+      <mc:AlternateContent xmlns:mc="http://schemas.openxmlformats.org/markup-compatibility/2006" xmlns:a14="http://schemas.microsoft.com/office/drawing/2010/main">
+        <mc:Choice Requires="a14">
           <p:sp>
             <p:nvSpPr>
               <p:cNvPr id="4" name="TextBox 3">
@@ -12201,7 +12201,7 @@
             </p:txBody>
           </p:sp>
         </mc:Choice>
-        <mc:Fallback>
+        <mc:Fallback xmlns="">
           <p:sp>
             <p:nvSpPr>
               <p:cNvPr id="4" name="TextBox 3">
@@ -12246,8 +12246,8 @@
           </p:sp>
         </mc:Fallback>
       </mc:AlternateContent>
-      <mc:AlternateContent xmlns:mc="http://schemas.openxmlformats.org/markup-compatibility/2006">
-        <mc:Choice xmlns:a14="http://schemas.microsoft.com/office/drawing/2010/main" Requires="a14">
+      <mc:AlternateContent xmlns:mc="http://schemas.openxmlformats.org/markup-compatibility/2006" xmlns:a14="http://schemas.microsoft.com/office/drawing/2010/main">
+        <mc:Choice Requires="a14">
           <p:sp>
             <p:nvSpPr>
               <p:cNvPr id="6" name="TextBox 5">
@@ -12603,7 +12603,7 @@
             </p:txBody>
           </p:sp>
         </mc:Choice>
-        <mc:Fallback>
+        <mc:Fallback xmlns="">
           <p:sp>
             <p:nvSpPr>
               <p:cNvPr id="6" name="TextBox 5">
@@ -12648,8 +12648,8 @@
           </p:sp>
         </mc:Fallback>
       </mc:AlternateContent>
-      <mc:AlternateContent xmlns:mc="http://schemas.openxmlformats.org/markup-compatibility/2006">
-        <mc:Choice xmlns:a14="http://schemas.microsoft.com/office/drawing/2010/main" Requires="a14">
+      <mc:AlternateContent xmlns:mc="http://schemas.openxmlformats.org/markup-compatibility/2006" xmlns:a14="http://schemas.microsoft.com/office/drawing/2010/main">
+        <mc:Choice Requires="a14">
           <p:sp>
             <p:nvSpPr>
               <p:cNvPr id="11" name="TextBox 10">
@@ -12746,7 +12746,7 @@
             </p:txBody>
           </p:sp>
         </mc:Choice>
-        <mc:Fallback>
+        <mc:Fallback xmlns="">
           <p:sp>
             <p:nvSpPr>
               <p:cNvPr id="11" name="TextBox 10">
@@ -13990,8 +13990,8 @@
           </a:p>
         </p:txBody>
       </p:sp>
-      <mc:AlternateContent xmlns:mc="http://schemas.openxmlformats.org/markup-compatibility/2006">
-        <mc:Choice xmlns:a14="http://schemas.microsoft.com/office/drawing/2010/main" Requires="a14">
+      <mc:AlternateContent xmlns:mc="http://schemas.openxmlformats.org/markup-compatibility/2006" xmlns:a14="http://schemas.microsoft.com/office/drawing/2010/main">
+        <mc:Choice Requires="a14">
           <p:sp>
             <p:nvSpPr>
               <p:cNvPr id="46" name="TextBox 45">
@@ -14170,7 +14170,7 @@
             </p:txBody>
           </p:sp>
         </mc:Choice>
-        <mc:Fallback>
+        <mc:Fallback xmlns="">
           <p:sp>
             <p:nvSpPr>
               <p:cNvPr id="46" name="TextBox 45">
@@ -14875,8 +14875,8 @@
           </a:p>
         </p:txBody>
       </p:sp>
-      <mc:AlternateContent xmlns:mc="http://schemas.openxmlformats.org/markup-compatibility/2006">
-        <mc:Choice xmlns:a14="http://schemas.microsoft.com/office/drawing/2010/main" Requires="a14">
+      <mc:AlternateContent xmlns:mc="http://schemas.openxmlformats.org/markup-compatibility/2006" xmlns:a14="http://schemas.microsoft.com/office/drawing/2010/main">
+        <mc:Choice Requires="a14">
           <p:sp>
             <p:nvSpPr>
               <p:cNvPr id="4" name="TextBox 3">
@@ -14990,7 +14990,7 @@
             </p:txBody>
           </p:sp>
         </mc:Choice>
-        <mc:Fallback>
+        <mc:Fallback xmlns="">
           <p:sp>
             <p:nvSpPr>
               <p:cNvPr id="4" name="TextBox 3">
@@ -15035,8 +15035,8 @@
           </p:sp>
         </mc:Fallback>
       </mc:AlternateContent>
-      <mc:AlternateContent xmlns:mc="http://schemas.openxmlformats.org/markup-compatibility/2006">
-        <mc:Choice xmlns:a14="http://schemas.microsoft.com/office/drawing/2010/main" Requires="a14">
+      <mc:AlternateContent xmlns:mc="http://schemas.openxmlformats.org/markup-compatibility/2006" xmlns:a14="http://schemas.microsoft.com/office/drawing/2010/main">
+        <mc:Choice Requires="a14">
           <p:sp>
             <p:nvSpPr>
               <p:cNvPr id="6" name="TextBox 5">
@@ -15392,7 +15392,7 @@
             </p:txBody>
           </p:sp>
         </mc:Choice>
-        <mc:Fallback>
+        <mc:Fallback xmlns="">
           <p:sp>
             <p:nvSpPr>
               <p:cNvPr id="6" name="TextBox 5">
@@ -15437,8 +15437,8 @@
           </p:sp>
         </mc:Fallback>
       </mc:AlternateContent>
-      <mc:AlternateContent xmlns:mc="http://schemas.openxmlformats.org/markup-compatibility/2006">
-        <mc:Choice xmlns:a14="http://schemas.microsoft.com/office/drawing/2010/main" Requires="a14">
+      <mc:AlternateContent xmlns:mc="http://schemas.openxmlformats.org/markup-compatibility/2006" xmlns:a14="http://schemas.microsoft.com/office/drawing/2010/main">
+        <mc:Choice Requires="a14">
           <p:sp>
             <p:nvSpPr>
               <p:cNvPr id="11" name="TextBox 10">
@@ -15535,7 +15535,7 @@
             </p:txBody>
           </p:sp>
         </mc:Choice>
-        <mc:Fallback>
+        <mc:Fallback xmlns="">
           <p:sp>
             <p:nvSpPr>
               <p:cNvPr id="11" name="TextBox 10">
@@ -16779,8 +16779,8 @@
           </a:p>
         </p:txBody>
       </p:sp>
-      <mc:AlternateContent xmlns:mc="http://schemas.openxmlformats.org/markup-compatibility/2006">
-        <mc:Choice xmlns:a14="http://schemas.microsoft.com/office/drawing/2010/main" Requires="a14">
+      <mc:AlternateContent xmlns:mc="http://schemas.openxmlformats.org/markup-compatibility/2006" xmlns:a14="http://schemas.microsoft.com/office/drawing/2010/main">
+        <mc:Choice Requires="a14">
           <p:sp>
             <p:nvSpPr>
               <p:cNvPr id="46" name="TextBox 45">
@@ -16959,7 +16959,7 @@
             </p:txBody>
           </p:sp>
         </mc:Choice>
-        <mc:Fallback>
+        <mc:Fallback xmlns="">
           <p:sp>
             <p:nvSpPr>
               <p:cNvPr id="46" name="TextBox 45">
@@ -18189,8 +18189,8 @@
           </p:sp>
         </mc:Fallback>
       </mc:AlternateContent>
-      <mc:AlternateContent xmlns:mc="http://schemas.openxmlformats.org/markup-compatibility/2006">
-        <mc:Choice xmlns:a14="http://schemas.microsoft.com/office/drawing/2010/main" Requires="a14">
+      <mc:AlternateContent xmlns:mc="http://schemas.openxmlformats.org/markup-compatibility/2006" xmlns:a14="http://schemas.microsoft.com/office/drawing/2010/main">
+        <mc:Choice Requires="a14">
           <p:sp>
             <p:nvSpPr>
               <p:cNvPr id="79" name="TextBox 78">
@@ -18634,7 +18634,7 @@
             </p:txBody>
           </p:sp>
         </mc:Choice>
-        <mc:Fallback>
+        <mc:Fallback xmlns="">
           <p:sp>
             <p:nvSpPr>
               <p:cNvPr id="79" name="TextBox 78">
@@ -19533,8 +19533,8 @@
           </p:sp>
         </mc:Fallback>
       </mc:AlternateContent>
-      <mc:AlternateContent xmlns:mc="http://schemas.openxmlformats.org/markup-compatibility/2006">
-        <mc:Choice xmlns:a14="http://schemas.microsoft.com/office/drawing/2010/main" Requires="a14">
+      <mc:AlternateContent xmlns:mc="http://schemas.openxmlformats.org/markup-compatibility/2006" xmlns:a14="http://schemas.microsoft.com/office/drawing/2010/main">
+        <mc:Choice Requires="a14">
           <p:sp>
             <p:nvSpPr>
               <p:cNvPr id="5" name="TextBox 4">
@@ -19888,7 +19888,7 @@
             </p:txBody>
           </p:sp>
         </mc:Choice>
-        <mc:Fallback>
+        <mc:Fallback xmlns="">
           <p:sp>
             <p:nvSpPr>
               <p:cNvPr id="5" name="TextBox 4">
@@ -27221,8 +27221,8 @@
           </p:sp>
         </mc:Fallback>
       </mc:AlternateContent>
-      <mc:AlternateContent xmlns:mc="http://schemas.openxmlformats.org/markup-compatibility/2006">
-        <mc:Choice xmlns:a14="http://schemas.microsoft.com/office/drawing/2010/main" Requires="a14">
+      <mc:AlternateContent xmlns:mc="http://schemas.openxmlformats.org/markup-compatibility/2006" xmlns:a14="http://schemas.microsoft.com/office/drawing/2010/main">
+        <mc:Choice Requires="a14">
           <p:sp>
             <p:nvSpPr>
               <p:cNvPr id="163" name="TextBox 162">
@@ -27488,7 +27488,7 @@
             </p:txBody>
           </p:sp>
         </mc:Choice>
-        <mc:Fallback>
+        <mc:Fallback xmlns="">
           <p:sp>
             <p:nvSpPr>
               <p:cNvPr id="163" name="TextBox 162">
@@ -35492,7 +35492,21 @@
                 <a:latin typeface="Beaufort for LOL" panose="02020503050000020004" pitchFamily="18" charset="0"/>
                 <a:cs typeface="Beaufort for LOL" panose="02020503050000020004" pitchFamily="18" charset="0"/>
               </a:rPr>
-              <a:t>we assumed independence of the hypotheses! But what if two hypotheses have similar outputs / risk? We shouldn’t count them separately!</a:t>
+              <a:t>we assumed independence of the hypotheses! But what if two hypotheses </a:t>
+            </a:r>
+            <a:r>
+              <a:rPr lang="en-US" sz="2400">
+                <a:latin typeface="Beaufort for LOL" panose="02020503050000020004" pitchFamily="18" charset="0"/>
+                <a:cs typeface="Beaufort for LOL" panose="02020503050000020004" pitchFamily="18" charset="0"/>
+              </a:rPr>
+              <a:t>have very similar </a:t>
+            </a:r>
+            <a:r>
+              <a:rPr lang="en-US" sz="2400" dirty="0">
+                <a:latin typeface="Beaufort for LOL" panose="02020503050000020004" pitchFamily="18" charset="0"/>
+                <a:cs typeface="Beaufort for LOL" panose="02020503050000020004" pitchFamily="18" charset="0"/>
+              </a:rPr>
+              <a:t>outputs for all possible inputs? We shouldn’t count them separately!</a:t>
             </a:r>
             <a:endParaRPr lang="LID4096" sz="2400" dirty="0">
               <a:latin typeface="Beaufort for LOL" panose="02020503050000020004" pitchFamily="18" charset="0"/>
@@ -36090,7 +36104,7 @@
                 <a:latin typeface="Beaufort for LOL" panose="02020503050000020004" pitchFamily="18" charset="0"/>
                 <a:cs typeface="Beaufort for LOL" panose="02020503050000020004" pitchFamily="18" charset="0"/>
               </a:rPr>
-              <a:t>All lines lead to the same classification / similar risk!</a:t>
+              <a:t>All lines shown here produce similar outputs!</a:t>
             </a:r>
             <a:endParaRPr lang="LID4096" sz="2400" dirty="0">
               <a:latin typeface="Beaufort for LOL" panose="02020503050000020004" pitchFamily="18" charset="0"/>
@@ -37458,8 +37472,8 @@
           </p:sp>
         </mc:Fallback>
       </mc:AlternateContent>
-      <mc:AlternateContent xmlns:mc="http://schemas.openxmlformats.org/markup-compatibility/2006">
-        <mc:Choice xmlns:a14="http://schemas.microsoft.com/office/drawing/2010/main" Requires="a14">
+      <mc:AlternateContent xmlns:mc="http://schemas.openxmlformats.org/markup-compatibility/2006" xmlns:a14="http://schemas.microsoft.com/office/drawing/2010/main">
+        <mc:Choice Requires="a14">
           <p:sp>
             <p:nvSpPr>
               <p:cNvPr id="9" name="TextBox 8">
@@ -37716,7 +37730,7 @@
             </p:txBody>
           </p:sp>
         </mc:Choice>
-        <mc:Fallback>
+        <mc:Fallback xmlns="">
           <p:sp>
             <p:nvSpPr>
               <p:cNvPr id="9" name="TextBox 8">
@@ -38276,8 +38290,8 @@
           </p:sp>
         </mc:Fallback>
       </mc:AlternateContent>
-      <mc:AlternateContent xmlns:mc="http://schemas.openxmlformats.org/markup-compatibility/2006">
-        <mc:Choice xmlns:a14="http://schemas.microsoft.com/office/drawing/2010/main" Requires="a14">
+      <mc:AlternateContent xmlns:mc="http://schemas.openxmlformats.org/markup-compatibility/2006" xmlns:a14="http://schemas.microsoft.com/office/drawing/2010/main">
+        <mc:Choice Requires="a14">
           <p:sp>
             <p:nvSpPr>
               <p:cNvPr id="6" name="TextBox 5">
@@ -38364,7 +38378,7 @@
             </p:txBody>
           </p:sp>
         </mc:Choice>
-        <mc:Fallback>
+        <mc:Fallback xmlns="">
           <p:sp>
             <p:nvSpPr>
               <p:cNvPr id="6" name="TextBox 5">

</xml_diff>